<commit_message>
Add various docs for 1st presentation
</commit_message>
<xml_diff>
--- a/docs/Project_Presenation_1.pptx
+++ b/docs/Project_Presenation_1.pptx
@@ -414,7 +414,7 @@
           <a:p>
             <a:fld id="{484FEB8E-57CB-43C0-BEF7-4F4116A5252C}" type="datetimeFigureOut">
               <a:rPr lang="de-CH" smtClean="0"/>
-              <a:t>03.04.22</a:t>
+              <a:t>05.04.22</a:t>
             </a:fld>
             <a:endParaRPr lang="de-CH"/>
           </a:p>
@@ -4476,37 +4476,24 @@
           <a:lstStyle/>
           <a:p>
             <a:r>
-              <a:rPr lang="de-CH" dirty="0"/>
-              <a:t>OS Project	</a:t>
+              <a:rPr lang="en-US" dirty="0"/>
+              <a:t>OS Project - </a:t>
+            </a:r>
+            <a:r>
+              <a:rPr lang="en-US" dirty="0" err="1"/>
+              <a:t>teCS</a:t>
+            </a:r>
+            <a:r>
+              <a:rPr lang="en-US" dirty="0"/>
+              <a:t>	</a:t>
             </a:r>
             <a:br>
-              <a:rPr lang="de-CH" dirty="0"/>
+              <a:rPr lang="en-US" dirty="0"/>
             </a:br>
             <a:r>
-              <a:rPr lang="de-CH" dirty="0"/>
-              <a:t>Terminal </a:t>
-            </a:r>
-            <a:r>
-              <a:rPr lang="de-CH" dirty="0" err="1"/>
-              <a:t>based</a:t>
-            </a:r>
-            <a:r>
-              <a:rPr lang="de-CH" dirty="0"/>
-              <a:t> </a:t>
-            </a:r>
-            <a:r>
-              <a:rPr lang="de-CH" dirty="0" err="1"/>
-              <a:t>text</a:t>
-            </a:r>
-            <a:r>
-              <a:rPr lang="de-CH" dirty="0"/>
-              <a:t> </a:t>
-            </a:r>
-            <a:r>
-              <a:rPr lang="de-CH" dirty="0" err="1"/>
-              <a:t>editor</a:t>
-            </a:r>
-            <a:endParaRPr lang="de-CH" dirty="0"/>
+              <a:rPr lang="en-US" dirty="0"/>
+              <a:t>Terminal based text editor </a:t>
+            </a:r>
           </a:p>
         </p:txBody>
       </p:sp>
@@ -4672,7 +4659,7 @@
           <p:nvPr>
             <p:extLst>
               <p:ext uri="{D42A27DB-BD31-4B8C-83A1-F6EECF244321}">
-                <p14:modId xmlns:p14="http://schemas.microsoft.com/office/powerpoint/2010/main" val="1280877468"/>
+                <p14:modId xmlns:p14="http://schemas.microsoft.com/office/powerpoint/2010/main" val="4093694433"/>
               </p:ext>
             </p:extLst>
           </p:nvPr>
@@ -4710,7 +4697,7 @@
                     <a:lstStyle/>
                     <a:p>
                       <a:r>
-                        <a:rPr lang="de-CH" dirty="0"/>
+                        <a:rPr lang="en-US" noProof="0"/>
                         <a:t>1</a:t>
                       </a:r>
                     </a:p>
@@ -4743,14 +4730,9 @@
                     <a:lstStyle/>
                     <a:p>
                       <a:r>
-                        <a:rPr lang="de-CH" dirty="0"/>
-                        <a:t>Project </a:t>
+                        <a:rPr lang="en-US" noProof="0"/>
+                        <a:t>Project Idea</a:t>
                       </a:r>
-                      <a:r>
-                        <a:rPr lang="de-CH" dirty="0" err="1"/>
-                        <a:t>Idea</a:t>
-                      </a:r>
-                      <a:endParaRPr lang="de-CH" dirty="0"/>
                     </a:p>
                   </a:txBody>
                   <a:tcPr marL="144000" marR="144000" marT="90000" marB="90000">
@@ -4788,7 +4770,7 @@
                     <a:lstStyle/>
                     <a:p>
                       <a:r>
-                        <a:rPr lang="de-CH" dirty="0"/>
+                        <a:rPr lang="en-US" noProof="0"/>
                         <a:t>2</a:t>
                       </a:r>
                     </a:p>
@@ -4820,10 +4802,9 @@
                     <a:lstStyle/>
                     <a:p>
                       <a:r>
-                        <a:rPr lang="en-US" dirty="0"/>
+                        <a:rPr lang="en-US" noProof="0"/>
                         <a:t>Requirements</a:t>
                       </a:r>
-                      <a:endParaRPr lang="de-CH" dirty="0"/>
                     </a:p>
                   </a:txBody>
                   <a:tcPr marL="144000" marR="144000" marT="90000" marB="90000">
@@ -4860,7 +4841,7 @@
                     <a:lstStyle/>
                     <a:p>
                       <a:r>
-                        <a:rPr lang="de-CH" dirty="0"/>
+                        <a:rPr lang="en-US" noProof="0"/>
                         <a:t>3</a:t>
                       </a:r>
                     </a:p>
@@ -4892,7 +4873,7 @@
                     <a:lstStyle/>
                     <a:p>
                       <a:r>
-                        <a:rPr lang="de-CH" dirty="0"/>
+                        <a:rPr lang="en-US" noProof="0"/>
                         <a:t>Project Timeline</a:t>
                       </a:r>
                     </a:p>
@@ -4931,7 +4912,7 @@
                     <a:lstStyle/>
                     <a:p>
                       <a:r>
-                        <a:rPr lang="de-CH" dirty="0"/>
+                        <a:rPr lang="en-US" noProof="0"/>
                         <a:t>4</a:t>
                       </a:r>
                     </a:p>
@@ -4963,10 +4944,9 @@
                     <a:lstStyle/>
                     <a:p>
                       <a:r>
-                        <a:rPr lang="de-CH" dirty="0" err="1"/>
+                        <a:rPr lang="en-US" noProof="0" dirty="0"/>
                         <a:t>Questions</a:t>
                       </a:r>
-                      <a:endParaRPr lang="de-CH" dirty="0"/>
                     </a:p>
                   </a:txBody>
                   <a:tcPr marL="144000" marR="144000" marT="90000" marB="90000">
@@ -5046,12 +5026,8 @@
           <a:lstStyle/>
           <a:p>
             <a:r>
-              <a:rPr lang="de-CH" dirty="0"/>
-              <a:t>Project </a:t>
-            </a:r>
-            <a:r>
-              <a:rPr lang="de-CH" dirty="0" err="1"/>
-              <a:t>Idea</a:t>
+              <a:rPr lang="en-US" dirty="0"/>
+              <a:t>Project Idea</a:t>
             </a:r>
             <a:br>
               <a:rPr lang="en-US" dirty="0"/>
@@ -5085,30 +5061,9 @@
               <a:buChar char="•"/>
             </a:pPr>
             <a:r>
-              <a:rPr lang="de-CH" dirty="0"/>
-              <a:t>Terminal </a:t>
-            </a:r>
-            <a:r>
-              <a:rPr lang="de-CH" dirty="0" err="1"/>
-              <a:t>based</a:t>
-            </a:r>
-            <a:r>
-              <a:rPr lang="de-CH" dirty="0"/>
-              <a:t> </a:t>
-            </a:r>
-            <a:r>
-              <a:rPr lang="de-CH" dirty="0" err="1"/>
-              <a:t>text</a:t>
-            </a:r>
-            <a:r>
-              <a:rPr lang="de-CH" dirty="0"/>
-              <a:t> </a:t>
-            </a:r>
-            <a:r>
-              <a:rPr lang="de-CH" dirty="0" err="1"/>
-              <a:t>editor</a:t>
-            </a:r>
-            <a:endParaRPr lang="de-CH" dirty="0"/>
+              <a:rPr lang="en-US" dirty="0"/>
+              <a:t>Motivation -&gt; daily needed program</a:t>
+            </a:r>
           </a:p>
           <a:p>
             <a:pPr marL="285750" indent="-285750">
@@ -5116,20 +5071,8 @@
               <a:buChar char="•"/>
             </a:pPr>
             <a:r>
-              <a:rPr lang="de-CH" dirty="0" err="1"/>
-              <a:t>Trimmed</a:t>
-            </a:r>
-            <a:r>
-              <a:rPr lang="de-CH" dirty="0"/>
-              <a:t> </a:t>
-            </a:r>
-            <a:r>
-              <a:rPr lang="de-CH" dirty="0" err="1"/>
-              <a:t>version</a:t>
-            </a:r>
-            <a:r>
-              <a:rPr lang="de-CH" dirty="0"/>
-              <a:t> </a:t>
+              <a:rPr lang="en-US" dirty="0"/>
+              <a:t>Terminal based text editor</a:t>
             </a:r>
           </a:p>
           <a:p>
@@ -5138,13 +5081,41 @@
               <a:buChar char="•"/>
             </a:pPr>
             <a:r>
-              <a:rPr lang="de-CH" dirty="0"/>
-              <a:t>Basic </a:t>
-            </a:r>
-            <a:r>
-              <a:rPr lang="de-CH" dirty="0" err="1"/>
-              <a:t>features</a:t>
-            </a:r>
+              <a:rPr lang="en-US" dirty="0"/>
+              <a:t>Trimmed version</a:t>
+            </a:r>
+          </a:p>
+          <a:p>
+            <a:pPr marL="285750" indent="-285750">
+              <a:buFont typeface="Arial" panose="020B0604020202020204" pitchFamily="34" charset="0"/>
+              <a:buChar char="•"/>
+            </a:pPr>
+            <a:r>
+              <a:rPr lang="en-US" dirty="0"/>
+              <a:t>Basic features</a:t>
+            </a:r>
+          </a:p>
+          <a:p>
+            <a:pPr marL="285750" indent="-285750">
+              <a:buFont typeface="Arial" panose="020B0604020202020204" pitchFamily="34" charset="0"/>
+              <a:buChar char="•"/>
+            </a:pPr>
+            <a:r>
+              <a:rPr lang="en-US" dirty="0"/>
+              <a:t>Importance </a:t>
+            </a:r>
+          </a:p>
+          <a:p>
+            <a:pPr marL="285750" indent="-285750">
+              <a:buFont typeface="Arial" panose="020B0604020202020204" pitchFamily="34" charset="0"/>
+              <a:buChar char="•"/>
+            </a:pPr>
+            <a:r>
+              <a:rPr lang="en-US" dirty="0"/>
+              <a:t>Implementation</a:t>
+            </a:r>
+          </a:p>
+          <a:p>
             <a:endParaRPr lang="de-CH" dirty="0"/>
           </a:p>
         </p:txBody>
@@ -5332,14 +5303,9 @@
               <a:buChar char="•"/>
             </a:pPr>
             <a:r>
-              <a:rPr lang="de-CH" dirty="0"/>
-              <a:t>Linux </a:t>
-            </a:r>
-            <a:r>
-              <a:rPr lang="de-CH" dirty="0" err="1"/>
-              <a:t>enviroment</a:t>
-            </a:r>
-            <a:endParaRPr lang="de-CH" dirty="0"/>
+              <a:rPr lang="en-US" dirty="0"/>
+              <a:t>Linux environment</a:t>
+            </a:r>
           </a:p>
           <a:p>
             <a:pPr marL="285750" indent="-285750">
@@ -5347,14 +5313,9 @@
               <a:buChar char="•"/>
             </a:pPr>
             <a:r>
-              <a:rPr lang="de-CH" dirty="0"/>
-              <a:t>C </a:t>
-            </a:r>
-            <a:r>
-              <a:rPr lang="de-CH" dirty="0" err="1"/>
-              <a:t>compiler</a:t>
-            </a:r>
-            <a:endParaRPr lang="de-CH" dirty="0"/>
+              <a:rPr lang="en-US" dirty="0"/>
+              <a:t>C</a:t>
+            </a:r>
           </a:p>
           <a:p>
             <a:pPr marL="285750" indent="-285750">
@@ -5362,10 +5323,10 @@
               <a:buChar char="•"/>
             </a:pPr>
             <a:r>
-              <a:rPr lang="de-CH" dirty="0" err="1"/>
+              <a:rPr lang="en-US" dirty="0" err="1"/>
               <a:t>Github</a:t>
             </a:r>
-            <a:endParaRPr lang="de-CH" dirty="0"/>
+            <a:endParaRPr lang="en-US" dirty="0"/>
           </a:p>
           <a:p>
             <a:pPr marL="285750" indent="-285750">
@@ -5373,10 +5334,10 @@
               <a:buChar char="•"/>
             </a:pPr>
             <a:r>
-              <a:rPr lang="de-CH" dirty="0" err="1"/>
+              <a:rPr lang="en-US" dirty="0" err="1"/>
               <a:t>Makefile</a:t>
             </a:r>
-            <a:endParaRPr lang="de-CH" dirty="0"/>
+            <a:endParaRPr lang="en-US" dirty="0"/>
           </a:p>
         </p:txBody>
       </p:sp>

</xml_diff>